<commit_message>
Added whitepaper associated suggested changes
</commit_message>
<xml_diff>
--- a/Documents/NH poster.pptx
+++ b/Documents/NH poster.pptx
@@ -3370,14 +3370,14 @@
                 <a:latin typeface="Arial" panose="020B0604020202020204" pitchFamily="34" charset="0"/>
                 <a:cs typeface="Arial" panose="020B0604020202020204" pitchFamily="34" charset="0"/>
               </a:rPr>
-              <a:t>The LTS-2 system exhibits a seasonal cycle although its overall usage seems to be decreasing. Use of the system spiked during November and December, however the magnitude of these spikes was much larger in 2016 as compared to 2017. The system saw a fairly consistent number of requests during the summers of 2016 and 2017</a:t>
+              <a:t>The LTS-2 system exhibits a seasonal cycle although its overall usage seems to be decreasing. Use of the system spiked during November and December, however the magnitude of these spikes was much larger in 2016 as compared to 2017. The system saw a fairly consistent number of requests during the summers of 2016 and </a:t>
             </a:r>
             <a:r>
               <a:rPr lang="en-US" sz="2000" dirty="0" smtClean="0">
                 <a:latin typeface="Arial" panose="020B0604020202020204" pitchFamily="34" charset="0"/>
                 <a:cs typeface="Arial" panose="020B0604020202020204" pitchFamily="34" charset="0"/>
               </a:rPr>
-              <a:t>.</a:t>
+              <a:t>2017. In some cases these spikes in usage are correlated with new users joining the system. In other cases the spikes result from existing users requesting more information.</a:t>
             </a:r>
           </a:p>
           <a:p>
@@ -3424,21 +3424,7 @@
           </a:p>
           <a:p>
             <a:pPr eaLnBrk="1" hangingPunct="1"/>
-            <a:endParaRPr lang="en-US" sz="2000" dirty="0" smtClean="0">
-              <a:latin typeface="Arial" panose="020B0604020202020204" pitchFamily="34" charset="0"/>
-              <a:cs typeface="Arial" panose="020B0604020202020204" pitchFamily="34" charset="0"/>
-            </a:endParaRPr>
-          </a:p>
-          <a:p>
-            <a:pPr eaLnBrk="1" hangingPunct="1"/>
             <a:endParaRPr lang="en-US" sz="2000" dirty="0">
-              <a:latin typeface="Arial" panose="020B0604020202020204" pitchFamily="34" charset="0"/>
-              <a:cs typeface="Arial" panose="020B0604020202020204" pitchFamily="34" charset="0"/>
-            </a:endParaRPr>
-          </a:p>
-          <a:p>
-            <a:pPr eaLnBrk="1" hangingPunct="1"/>
-            <a:endParaRPr lang="en-US" sz="2000" dirty="0" smtClean="0">
               <a:latin typeface="Arial" panose="020B0604020202020204" pitchFamily="34" charset="0"/>
               <a:cs typeface="Arial" panose="020B0604020202020204" pitchFamily="34" charset="0"/>
             </a:endParaRPr>
@@ -3853,7 +3839,7 @@
         </p:nvSpPr>
         <p:spPr bwMode="auto">
           <a:xfrm>
-            <a:off x="21954097" y="3653687"/>
+            <a:off x="21954097" y="3635382"/>
             <a:ext cx="9875520" cy="7276658"/>
           </a:xfrm>
           <a:prstGeom prst="rect">
@@ -4095,7 +4081,14 @@
                 <a:latin typeface="Arial" panose="020B0604020202020204" pitchFamily="34" charset="0"/>
                 <a:cs typeface="Arial" panose="020B0604020202020204" pitchFamily="34" charset="0"/>
               </a:rPr>
-              <a:t>The flux of the user base can be quantified by calculating the churn rate. Churn rate is defined as the proportion of people who use the system for the last time in a given month. It should be noted that users are tracked by phone number so a user who changes phone numbers will appear as having dropped out of the system. This may help explain the extremely high churn rate in December of 2016.</a:t>
+              <a:t>The flux of the user base can be quantified by calculating the churn rate. Churn rate is defined as the proportion of people who use the system for the last time in a given month. It should be noted that users are tracked by phone number so a user who changes phone numbers will appear as having dropped out of the system. This may help explain the extremely high churn rate in December of 2016</a:t>
+            </a:r>
+            <a:r>
+              <a:rPr lang="en-US" sz="2000" dirty="0" smtClean="0">
+                <a:latin typeface="Arial" panose="020B0604020202020204" pitchFamily="34" charset="0"/>
+                <a:cs typeface="Arial" panose="020B0604020202020204" pitchFamily="34" charset="0"/>
+              </a:rPr>
+              <a:t>.</a:t>
             </a:r>
           </a:p>
         </p:txBody>
@@ -4108,7 +4101,7 @@
         </p:nvSpPr>
         <p:spPr>
           <a:xfrm>
-            <a:off x="21954097" y="3196487"/>
+            <a:off x="21954097" y="3171225"/>
             <a:ext cx="9875520" cy="457200"/>
           </a:xfrm>
           <a:prstGeom prst="rect">
@@ -4778,7 +4771,15 @@
                   <a:schemeClr val="bg1"/>
                 </a:solidFill>
               </a:rPr>
-              <a:t>Use over time</a:t>
+              <a:t>Use </a:t>
+            </a:r>
+            <a:r>
+              <a:rPr lang="en-US" sz="3200" b="1" dirty="0" smtClean="0">
+                <a:solidFill>
+                  <a:schemeClr val="bg1"/>
+                </a:solidFill>
+              </a:rPr>
+              <a:t>Over Time</a:t>
             </a:r>
             <a:endParaRPr lang="en-US" sz="3200" b="1" dirty="0">
               <a:solidFill>
@@ -5975,47 +5976,6 @@
           </a:p>
         </p:txBody>
       </p:sp>
-      <p:pic>
-        <p:nvPicPr>
-          <p:cNvPr id="47" name="Picture 16" descr="https://lh6.googleusercontent.com/Q80W_GZTRWdBQLA6znLImJZjZDAQENXJQ8-4C2n5fjFgb6REDZSqmsSoXuD3bO-P6_8m36SZ8BLD1PJNo3vL4uad1YDUSccakb6b6Cggn8lvCkd0g1fHRxndNP6evjO8Tz1do3If"/>
-          <p:cNvPicPr>
-            <a:picLocks noChangeAspect="1" noChangeArrowheads="1"/>
-          </p:cNvPicPr>
-          <p:nvPr/>
-        </p:nvPicPr>
-        <p:blipFill>
-          <a:blip r:embed="rId5">
-            <a:extLst>
-              <a:ext uri="{28A0092B-C50C-407E-A947-70E740481C1C}">
-                <a14:useLocalDpi xmlns:a14="http://schemas.microsoft.com/office/drawing/2010/main" val="0"/>
-              </a:ext>
-            </a:extLst>
-          </a:blip>
-          <a:srcRect/>
-          <a:stretch>
-            <a:fillRect/>
-          </a:stretch>
-        </p:blipFill>
-        <p:spPr bwMode="auto">
-          <a:xfrm>
-            <a:off x="12614658" y="14007916"/>
-            <a:ext cx="7392486" cy="4561323"/>
-          </a:xfrm>
-          <a:prstGeom prst="rect">
-            <a:avLst/>
-          </a:prstGeom>
-          <a:noFill/>
-          <a:extLst>
-            <a:ext uri="{909E8E84-426E-40DD-AFC4-6F175D3DCCD1}">
-              <a14:hiddenFill xmlns:a14="http://schemas.microsoft.com/office/drawing/2010/main">
-                <a:solidFill>
-                  <a:srgbClr val="FFFFFF"/>
-                </a:solidFill>
-              </a14:hiddenFill>
-            </a:ext>
-          </a:extLst>
-        </p:spPr>
-      </p:pic>
       <p:sp>
         <p:nvSpPr>
           <p:cNvPr id="48" name="Text Box 180"/>
@@ -6026,8 +5986,8 @@
         </p:nvSpPr>
         <p:spPr bwMode="auto">
           <a:xfrm>
-            <a:off x="12115800" y="18562373"/>
-            <a:ext cx="5782762" cy="541893"/>
+            <a:off x="11621311" y="18744999"/>
+            <a:ext cx="7925144" cy="541893"/>
           </a:xfrm>
           <a:prstGeom prst="rect">
             <a:avLst/>
@@ -6192,13 +6152,43 @@
               <a:rPr lang="en-US" sz="1600" dirty="0">
                 <a:latin typeface="Calibri" pitchFamily="34" charset="0"/>
               </a:rPr>
-              <a:t>The total number of requests received by the LTS-2 system</a:t>
+              <a:t>The total number of requests </a:t>
+            </a:r>
+            <a:r>
+              <a:rPr lang="en-US" sz="1600" dirty="0" smtClean="0">
+                <a:latin typeface="Calibri" pitchFamily="34" charset="0"/>
+              </a:rPr>
+              <a:t>received </a:t>
+            </a:r>
+            <a:r>
+              <a:rPr lang="en-US" sz="1600" dirty="0">
+                <a:latin typeface="Calibri" pitchFamily="34" charset="0"/>
+              </a:rPr>
+              <a:t>by </a:t>
+            </a:r>
+            <a:r>
+              <a:rPr lang="en-US" sz="1600" dirty="0" smtClean="0">
+                <a:latin typeface="Calibri" pitchFamily="34" charset="0"/>
+              </a:rPr>
+              <a:t>and new users joining the </a:t>
+            </a:r>
+            <a:r>
+              <a:rPr lang="en-US" sz="1600" dirty="0">
+                <a:latin typeface="Calibri" pitchFamily="34" charset="0"/>
+              </a:rPr>
+              <a:t>LTS-2 </a:t>
+            </a:r>
+            <a:r>
+              <a:rPr lang="en-US" sz="1600" dirty="0" smtClean="0">
+                <a:latin typeface="Calibri" pitchFamily="34" charset="0"/>
+              </a:rPr>
+              <a:t>system</a:t>
             </a:r>
             <a:r>
               <a:rPr lang="en-US" sz="1600" b="1" dirty="0" smtClean="0">
                 <a:latin typeface="Calibri" pitchFamily="34" charset="0"/>
               </a:rPr>
-              <a:t> </a:t>
+              <a:t>.</a:t>
             </a:r>
             <a:endParaRPr lang="en-US" sz="1600" dirty="0">
               <a:latin typeface="Calibri" pitchFamily="34" charset="0"/>
@@ -6408,7 +6398,7 @@
           <p:nvPr/>
         </p:nvPicPr>
         <p:blipFill>
-          <a:blip r:embed="rId6">
+          <a:blip r:embed="rId5">
             <a:extLst>
               <a:ext uri="{28A0092B-C50C-407E-A947-70E740481C1C}">
                 <a14:useLocalDpi xmlns:a14="http://schemas.microsoft.com/office/drawing/2010/main" val="0"/>
@@ -6449,7 +6439,7 @@
           <p:nvPr/>
         </p:nvPicPr>
         <p:blipFill rotWithShape="1">
-          <a:blip r:embed="rId7" cstate="print">
+          <a:blip r:embed="rId6" cstate="print">
             <a:extLst>
               <a:ext uri="{28A0092B-C50C-407E-A947-70E740481C1C}">
                 <a14:useLocalDpi xmlns:a14="http://schemas.microsoft.com/office/drawing/2010/main" val="0"/>
@@ -6478,7 +6468,7 @@
           <p:nvPr/>
         </p:nvPicPr>
         <p:blipFill>
-          <a:blip r:embed="rId8"/>
+          <a:blip r:embed="rId7"/>
           <a:stretch>
             <a:fillRect/>
           </a:stretch>
@@ -6491,6 +6481,47 @@
           <a:prstGeom prst="rect">
             <a:avLst/>
           </a:prstGeom>
+        </p:spPr>
+      </p:pic>
+      <p:pic>
+        <p:nvPicPr>
+          <p:cNvPr id="1026" name="Picture 2" descr="unnamed-chunk-9-1.png"/>
+          <p:cNvPicPr>
+            <a:picLocks noChangeAspect="1" noChangeArrowheads="1"/>
+          </p:cNvPicPr>
+          <p:nvPr/>
+        </p:nvPicPr>
+        <p:blipFill>
+          <a:blip r:embed="rId8">
+            <a:extLst>
+              <a:ext uri="{28A0092B-C50C-407E-A947-70E740481C1C}">
+                <a14:useLocalDpi xmlns:a14="http://schemas.microsoft.com/office/drawing/2010/main" val="0"/>
+              </a:ext>
+            </a:extLst>
+          </a:blip>
+          <a:srcRect/>
+          <a:stretch>
+            <a:fillRect/>
+          </a:stretch>
+        </p:blipFill>
+        <p:spPr bwMode="auto">
+          <a:xfrm>
+            <a:off x="13406092" y="14350271"/>
+            <a:ext cx="6104775" cy="4360553"/>
+          </a:xfrm>
+          <a:prstGeom prst="rect">
+            <a:avLst/>
+          </a:prstGeom>
+          <a:noFill/>
+          <a:extLst>
+            <a:ext uri="{909E8E84-426E-40DD-AFC4-6F175D3DCCD1}">
+              <a14:hiddenFill xmlns:a14="http://schemas.microsoft.com/office/drawing/2010/main">
+                <a:solidFill>
+                  <a:srgbClr val="FFFFFF"/>
+                </a:solidFill>
+              </a14:hiddenFill>
+            </a:ext>
+          </a:extLst>
         </p:spPr>
       </p:pic>
     </p:spTree>

</xml_diff>